<commit_message>
almost finished 11:00, 12/11
</commit_message>
<xml_diff>
--- a/documents/faceDetection_PPT1 .pptx
+++ b/documents/faceDetection_PPT1 .pptx
@@ -5,7 +5,7 @@
     <p:sldMasterId id="2147483659" r:id="rId1"/>
   </p:sldMasterIdLst>
   <p:notesMasterIdLst>
-    <p:notesMasterId r:id="rId8"/>
+    <p:notesMasterId r:id="rId7"/>
   </p:notesMasterIdLst>
   <p:sldIdLst>
     <p:sldId id="256" r:id="rId2"/>
@@ -13,36 +13,35 @@
     <p:sldId id="260" r:id="rId4"/>
     <p:sldId id="258" r:id="rId5"/>
     <p:sldId id="261" r:id="rId6"/>
-    <p:sldId id="259" r:id="rId7"/>
   </p:sldIdLst>
   <p:sldSz cx="9144000" cy="6858000" type="screen4x3"/>
   <p:notesSz cx="6858000" cy="9144000"/>
   <p:embeddedFontLst>
     <p:embeddedFont>
       <p:font typeface="Verdana" pitchFamily="34" charset="0"/>
-      <p:regular r:id="rId9"/>
-      <p:bold r:id="rId10"/>
-      <p:italic r:id="rId11"/>
-      <p:boldItalic r:id="rId12"/>
+      <p:regular r:id="rId8"/>
+      <p:bold r:id="rId9"/>
+      <p:italic r:id="rId10"/>
+      <p:boldItalic r:id="rId11"/>
     </p:embeddedFont>
     <p:embeddedFont>
       <p:font typeface="Georgia" pitchFamily="18" charset="0"/>
-      <p:regular r:id="rId13"/>
-      <p:bold r:id="rId14"/>
-      <p:italic r:id="rId15"/>
-      <p:boldItalic r:id="rId16"/>
+      <p:regular r:id="rId12"/>
+      <p:bold r:id="rId13"/>
+      <p:italic r:id="rId14"/>
+      <p:boldItalic r:id="rId15"/>
     </p:embeddedFont>
     <p:embeddedFont>
       <p:font typeface="Times" pitchFamily="18" charset="0"/>
-      <p:regular r:id="rId17"/>
-      <p:bold r:id="rId18"/>
-      <p:italic r:id="rId19"/>
-      <p:boldItalic r:id="rId20"/>
+      <p:regular r:id="rId16"/>
+      <p:bold r:id="rId17"/>
+      <p:italic r:id="rId18"/>
+      <p:boldItalic r:id="rId19"/>
     </p:embeddedFont>
     <p:embeddedFont>
       <p:font typeface="Arimo" charset="0"/>
-      <p:regular r:id="rId21"/>
-      <p:bold r:id="rId22"/>
+      <p:regular r:id="rId20"/>
+      <p:bold r:id="rId21"/>
     </p:embeddedFont>
   </p:embeddedFontLst>
   <p:defaultTextStyle>
@@ -805,107 +804,6 @@
       <p:sp>
         <p:nvSpPr>
           <p:cNvPr id="76" name="Shape 76"/>
-          <p:cNvSpPr txBox="1">
-            <a:spLocks noGrp="1"/>
-          </p:cNvSpPr>
-          <p:nvPr>
-            <p:ph type="body" idx="1"/>
-          </p:nvPr>
-        </p:nvSpPr>
-        <p:spPr>
-          <a:xfrm>
-            <a:off x="685800" y="4343400"/>
-            <a:ext cx="5486400" cy="4114800"/>
-          </a:xfrm>
-          <a:prstGeom prst="rect">
-            <a:avLst/>
-          </a:prstGeom>
-        </p:spPr>
-        <p:txBody>
-          <a:bodyPr wrap="square" lIns="91425" tIns="91425" rIns="91425" bIns="91425" anchor="t" anchorCtr="0">
-            <a:noAutofit/>
-          </a:bodyPr>
-          <a:lstStyle/>
-          <a:p>
-            <a:pPr marL="0" lvl="0" indent="0">
-              <a:spcBef>
-                <a:spcPts val="0"/>
-              </a:spcBef>
-              <a:buNone/>
-            </a:pPr>
-            <a:endParaRPr/>
-          </a:p>
-        </p:txBody>
-      </p:sp>
-    </p:spTree>
-  </p:cSld>
-  <p:clrMapOvr>
-    <a:masterClrMapping/>
-  </p:clrMapOvr>
-</p:notes>
-</file>
-
-<file path=ppt/notesSlides/notesSlide4.xml><?xml version="1.0" encoding="utf-8"?>
-<p:notes xmlns:a="http://schemas.openxmlformats.org/drawingml/2006/main" xmlns:r="http://schemas.openxmlformats.org/officeDocument/2006/relationships" xmlns:p="http://schemas.openxmlformats.org/presentationml/2006/main" showMasterSp="0" showMasterPhAnim="0">
-  <p:cSld>
-    <p:spTree>
-      <p:nvGrpSpPr>
-        <p:cNvPr id="1" name="Shape 81"/>
-        <p:cNvGrpSpPr/>
-        <p:nvPr/>
-      </p:nvGrpSpPr>
-      <p:grpSpPr>
-        <a:xfrm>
-          <a:off x="0" y="0"/>
-          <a:ext cx="0" cy="0"/>
-          <a:chOff x="0" y="0"/>
-          <a:chExt cx="0" cy="0"/>
-        </a:xfrm>
-      </p:grpSpPr>
-      <p:sp>
-        <p:nvSpPr>
-          <p:cNvPr id="82" name="Shape 82"/>
-          <p:cNvSpPr>
-            <a:spLocks noGrp="1" noRot="1" noChangeAspect="1"/>
-          </p:cNvSpPr>
-          <p:nvPr>
-            <p:ph type="sldImg" idx="2"/>
-          </p:nvPr>
-        </p:nvSpPr>
-        <p:spPr>
-          <a:xfrm>
-            <a:off x="1143000" y="685800"/>
-            <a:ext cx="4572000" cy="3429000"/>
-          </a:xfrm>
-          <a:custGeom>
-            <a:avLst/>
-            <a:gdLst/>
-            <a:ahLst/>
-            <a:cxnLst/>
-            <a:rect l="0" t="0" r="0" b="0"/>
-            <a:pathLst>
-              <a:path w="120000" h="120000" extrusionOk="0">
-                <a:moveTo>
-                  <a:pt x="0" y="0"/>
-                </a:moveTo>
-                <a:lnTo>
-                  <a:pt x="120000" y="0"/>
-                </a:lnTo>
-                <a:lnTo>
-                  <a:pt x="120000" y="120000"/>
-                </a:lnTo>
-                <a:lnTo>
-                  <a:pt x="0" y="120000"/>
-                </a:lnTo>
-                <a:close/>
-              </a:path>
-            </a:pathLst>
-          </a:custGeom>
-        </p:spPr>
-      </p:sp>
-      <p:sp>
-        <p:nvSpPr>
-          <p:cNvPr id="83" name="Shape 83"/>
           <p:cNvSpPr txBox="1">
             <a:spLocks noGrp="1"/>
           </p:cNvSpPr>
@@ -8889,27 +8787,11 @@
             <a:pPr lvl="1"/>
             <a:r>
               <a:rPr lang="en-US" dirty="0" smtClean="0"/>
-              <a:t>Background</a:t>
-            </a:r>
-            <a:r>
-              <a:rPr lang="en-US" dirty="0" smtClean="0"/>
-              <a:t>: Databases for Face Detection and Pose </a:t>
-            </a:r>
-            <a:r>
-              <a:rPr lang="en-US" dirty="0" smtClean="0"/>
-              <a:t>Estimation </a:t>
+              <a:t>Background: Databases for Face Detection and Pose Estimation </a:t>
             </a:r>
             <a:r>
               <a:rPr lang="en-US" sz="1200" dirty="0" smtClean="0"/>
-              <a:t>http</a:t>
-            </a:r>
-            <a:r>
-              <a:rPr lang="en-US" sz="1200" dirty="0" smtClean="0"/>
-              <a:t>://</a:t>
-            </a:r>
-            <a:r>
-              <a:rPr lang="en-US" sz="1200" dirty="0" smtClean="0"/>
-              <a:t>robotics.csie.ncku.edu.tw/Databases/FaceDetect_PoseEstimate.html</a:t>
+              <a:t>http://robotics.csie.ncku.edu.tw/Databases/FaceDetect_PoseEstimate.html</a:t>
             </a:r>
             <a:r>
               <a:rPr lang="en-US" dirty="0" smtClean="0"/>
@@ -8976,7 +8858,7 @@
               <a:buNone/>
             </a:pPr>
             <a:r>
-              <a:rPr lang="en-US" dirty="0"/>
+              <a:rPr lang="en-US" sz="1400" dirty="0"/>
               <a:t>Same as PASCAL VOC dataset</a:t>
             </a:r>
           </a:p>
@@ -8988,7 +8870,7 @@
               <a:buSzPts val="2000"/>
             </a:pPr>
             <a:r>
-              <a:rPr lang="en-US" sz="2000" dirty="0"/>
+              <a:rPr lang="en-US" sz="1400" dirty="0"/>
               <a:t>If the ratio of the intersection of a detected region with an annotated face region is greater than 0.5, a score of 1 is assigned to the detected region, and 0 otherwise.</a:t>
             </a:r>
           </a:p>
@@ -9000,7 +8882,7 @@
               <a:buSzPts val="2000"/>
             </a:pPr>
             <a:r>
-              <a:rPr lang="en-US" sz="2000" dirty="0"/>
+              <a:rPr lang="en-US" sz="1400" dirty="0"/>
               <a:t>A Precision-Recall curve will be generated.</a:t>
             </a:r>
           </a:p>
@@ -9021,8 +8903,8 @@
         </p:blipFill>
         <p:spPr>
           <a:xfrm>
-            <a:off x="546652" y="3192401"/>
-            <a:ext cx="8050696" cy="3530601"/>
+            <a:off x="4038999" y="4194937"/>
+            <a:ext cx="5105001" cy="2338066"/>
           </a:xfrm>
           <a:prstGeom prst="rect">
             <a:avLst/>
@@ -9069,6 +8951,110 @@
           </a:p>
         </p:txBody>
       </p:sp>
+      <p:pic>
+        <p:nvPicPr>
+          <p:cNvPr id="1026" name="Picture 2" descr="C:\Users\Jian Yang\Documents\GitHub\faceDetection\code\1-false.png"/>
+          <p:cNvPicPr>
+            <a:picLocks noChangeAspect="1" noChangeArrowheads="1"/>
+          </p:cNvPicPr>
+          <p:nvPr/>
+        </p:nvPicPr>
+        <p:blipFill>
+          <a:blip r:embed="rId4"/>
+          <a:srcRect l="19151" t="10355" r="19421" b="27622"/>
+          <a:stretch>
+            <a:fillRect/>
+          </a:stretch>
+        </p:blipFill>
+        <p:spPr bwMode="auto">
+          <a:xfrm>
+            <a:off x="0" y="2357610"/>
+            <a:ext cx="2533879" cy="1650270"/>
+          </a:xfrm>
+          <a:prstGeom prst="rect">
+            <a:avLst/>
+          </a:prstGeom>
+          <a:noFill/>
+        </p:spPr>
+      </p:pic>
+      <p:pic>
+        <p:nvPicPr>
+          <p:cNvPr id="1027" name="Picture 3" descr="C:\Users\Jian Yang\Documents\GitHub\faceDetection\code\1-true.png"/>
+          <p:cNvPicPr>
+            <a:picLocks noChangeAspect="1" noChangeArrowheads="1"/>
+          </p:cNvPicPr>
+          <p:nvPr/>
+        </p:nvPicPr>
+        <p:blipFill>
+          <a:blip r:embed="rId5"/>
+          <a:srcRect l="19161" t="11135" r="19975" b="27106"/>
+          <a:stretch>
+            <a:fillRect/>
+          </a:stretch>
+        </p:blipFill>
+        <p:spPr bwMode="auto">
+          <a:xfrm>
+            <a:off x="0" y="4538950"/>
+            <a:ext cx="2511847" cy="1695324"/>
+          </a:xfrm>
+          <a:prstGeom prst="rect">
+            <a:avLst/>
+          </a:prstGeom>
+          <a:noFill/>
+        </p:spPr>
+      </p:pic>
+      <p:pic>
+        <p:nvPicPr>
+          <p:cNvPr id="2" name="Picture 2" descr="C:\Users\Jian Yang\Documents\GitHub\faceDetection\code\3-false.png"/>
+          <p:cNvPicPr>
+            <a:picLocks noChangeAspect="1" noChangeArrowheads="1"/>
+          </p:cNvPicPr>
+          <p:nvPr/>
+        </p:nvPicPr>
+        <p:blipFill>
+          <a:blip r:embed="rId6"/>
+          <a:srcRect l="19833" t="10321" r="20239" b="26707"/>
+          <a:stretch>
+            <a:fillRect/>
+          </a:stretch>
+        </p:blipFill>
+        <p:spPr bwMode="auto">
+          <a:xfrm>
+            <a:off x="6081311" y="2364971"/>
+            <a:ext cx="2445744" cy="1623135"/>
+          </a:xfrm>
+          <a:prstGeom prst="rect">
+            <a:avLst/>
+          </a:prstGeom>
+          <a:noFill/>
+        </p:spPr>
+      </p:pic>
+      <p:pic>
+        <p:nvPicPr>
+          <p:cNvPr id="3" name="Picture 3" descr="C:\Users\Jian Yang\Documents\GitHub\faceDetection\code\2-false.png"/>
+          <p:cNvPicPr>
+            <a:picLocks noChangeAspect="1" noChangeArrowheads="1"/>
+          </p:cNvPicPr>
+          <p:nvPr/>
+        </p:nvPicPr>
+        <p:blipFill>
+          <a:blip r:embed="rId7"/>
+          <a:srcRect l="17966" t="9782" r="18565" b="27456"/>
+          <a:stretch>
+            <a:fillRect/>
+          </a:stretch>
+        </p:blipFill>
+        <p:spPr bwMode="auto">
+          <a:xfrm>
+            <a:off x="3238956" y="2324559"/>
+            <a:ext cx="2756745" cy="1586429"/>
+          </a:xfrm>
+          <a:prstGeom prst="rect">
+            <a:avLst/>
+          </a:prstGeom>
+          <a:noFill/>
+        </p:spPr>
+      </p:pic>
     </p:spTree>
   </p:cSld>
   <p:clrMapOvr>
@@ -9134,15 +9120,23 @@
           <a:p>
             <a:r>
               <a:rPr lang="en-US" dirty="0" smtClean="0"/>
-              <a:t>Keep improving our baseline approach through training on  larger training and testing dataset</a:t>
+              <a:t>Keep improving our baseline approach through training </a:t>
             </a:r>
             <a:r>
               <a:rPr lang="en-US" dirty="0" smtClean="0"/>
-              <a:t>.</a:t>
+              <a:t>larger </a:t>
             </a:r>
             <a:r>
               <a:rPr lang="en-US" dirty="0" smtClean="0"/>
-              <a:t> Obtain detailed precision and recall accuracy.</a:t>
+              <a:t>training and testing </a:t>
+            </a:r>
+            <a:r>
+              <a:rPr lang="en-US" dirty="0" smtClean="0"/>
+              <a:t>dataset, extracting various features. </a:t>
+            </a:r>
+            <a:r>
+              <a:rPr lang="en-US" dirty="0" smtClean="0"/>
+              <a:t>Obtain detailed precision and recall accuracy.</a:t>
             </a:r>
           </a:p>
           <a:p>
@@ -9156,9 +9150,21 @@
             </a:r>
             <a:r>
               <a:rPr lang="en-US" dirty="0" smtClean="0"/>
-              <a:t> model: use edge box /selective search as region proposal, use SVM as the last layer.</a:t>
+              <a:t> model: use edge box /selective search as region proposal, use SVM as the last layer</a:t>
             </a:r>
-            <a:endParaRPr lang="en-US" smtClean="0"/>
+            <a:r>
+              <a:rPr lang="en-US" dirty="0" smtClean="0"/>
+              <a:t>.</a:t>
+            </a:r>
+          </a:p>
+          <a:p>
+            <a:endParaRPr lang="en-US" dirty="0" smtClean="0"/>
+          </a:p>
+          <a:p>
+            <a:endParaRPr lang="en-US" dirty="0" smtClean="0"/>
+          </a:p>
+          <a:p>
+            <a:endParaRPr lang="en-US" dirty="0" smtClean="0"/>
           </a:p>
           <a:p>
             <a:endParaRPr lang="en-US" dirty="0" smtClean="0"/>
@@ -9171,101 +9177,6 @@
           </a:p>
           <a:p>
             <a:endParaRPr lang="en-US" dirty="0"/>
-          </a:p>
-        </p:txBody>
-      </p:sp>
-    </p:spTree>
-  </p:cSld>
-  <p:clrMapOvr>
-    <a:masterClrMapping/>
-  </p:clrMapOvr>
-</p:sld>
-</file>
-
-<file path=ppt/slides/slide6.xml><?xml version="1.0" encoding="utf-8"?>
-<p:sld xmlns:a="http://schemas.openxmlformats.org/drawingml/2006/main" xmlns:r="http://schemas.openxmlformats.org/officeDocument/2006/relationships" xmlns:p="http://schemas.openxmlformats.org/presentationml/2006/main">
-  <p:cSld>
-    <p:spTree>
-      <p:nvGrpSpPr>
-        <p:cNvPr id="1" name="Shape 84"/>
-        <p:cNvGrpSpPr/>
-        <p:nvPr/>
-      </p:nvGrpSpPr>
-      <p:grpSpPr>
-        <a:xfrm>
-          <a:off x="0" y="0"/>
-          <a:ext cx="0" cy="0"/>
-          <a:chOff x="0" y="0"/>
-          <a:chExt cx="0" cy="0"/>
-        </a:xfrm>
-      </p:grpSpPr>
-      <p:sp>
-        <p:nvSpPr>
-          <p:cNvPr id="85" name="Shape 85"/>
-          <p:cNvSpPr txBox="1">
-            <a:spLocks noGrp="1"/>
-          </p:cNvSpPr>
-          <p:nvPr>
-            <p:ph type="title"/>
-          </p:nvPr>
-        </p:nvSpPr>
-        <p:spPr>
-          <a:xfrm>
-            <a:off x="0" y="609600"/>
-            <a:ext cx="9144000" cy="533400"/>
-          </a:xfrm>
-          <a:prstGeom prst="rect">
-            <a:avLst/>
-          </a:prstGeom>
-        </p:spPr>
-        <p:txBody>
-          <a:bodyPr wrap="square" lIns="91425" tIns="91425" rIns="91425" bIns="91425" anchor="ctr" anchorCtr="0">
-            <a:noAutofit/>
-          </a:bodyPr>
-          <a:lstStyle/>
-          <a:p>
-            <a:r>
-              <a:rPr lang="en-US" dirty="0"/>
-              <a:t>Final Goal</a:t>
-            </a:r>
-          </a:p>
-        </p:txBody>
-      </p:sp>
-      <p:sp>
-        <p:nvSpPr>
-          <p:cNvPr id="86" name="Shape 86"/>
-          <p:cNvSpPr txBox="1">
-            <a:spLocks noGrp="1"/>
-          </p:cNvSpPr>
-          <p:nvPr>
-            <p:ph type="body" idx="1"/>
-          </p:nvPr>
-        </p:nvSpPr>
-        <p:spPr>
-          <a:xfrm>
-            <a:off x="0" y="1371600"/>
-            <a:ext cx="9144000" cy="4495800"/>
-          </a:xfrm>
-          <a:prstGeom prst="rect">
-            <a:avLst/>
-          </a:prstGeom>
-        </p:spPr>
-        <p:txBody>
-          <a:bodyPr wrap="square" lIns="91425" tIns="91425" rIns="91425" bIns="91425" anchor="t" anchorCtr="0">
-            <a:noAutofit/>
-          </a:bodyPr>
-          <a:lstStyle/>
-          <a:p>
-            <a:pPr>
-              <a:spcBef>
-                <a:spcPts val="0"/>
-              </a:spcBef>
-              <a:buNone/>
-            </a:pPr>
-            <a:r>
-              <a:rPr lang="en-US" dirty="0"/>
-              <a:t>Use current approach (HOG+SVM) as a multiscale proposal and feed it into a detection network for final results.</a:t>
-            </a:r>
           </a:p>
         </p:txBody>
       </p:sp>

</xml_diff>